<commit_message>
Updated slides as presented
</commit_message>
<xml_diff>
--- a/CCHMC Microbiome Workshop - Amplicon Deniosing - 7-10-19.pptx
+++ b/CCHMC Microbiome Workshop - Amplicon Deniosing - 7-10-19.pptx
@@ -13,16 +13,16 @@
     <p:sldId id="323" r:id="rId4"/>
     <p:sldId id="298" r:id="rId5"/>
     <p:sldId id="463" r:id="rId6"/>
-    <p:sldId id="462" r:id="rId7"/>
-    <p:sldId id="383" r:id="rId8"/>
-    <p:sldId id="437" r:id="rId9"/>
-    <p:sldId id="468" r:id="rId10"/>
-    <p:sldId id="464" r:id="rId11"/>
-    <p:sldId id="278" r:id="rId12"/>
-    <p:sldId id="473" r:id="rId13"/>
-    <p:sldId id="289" r:id="rId14"/>
-    <p:sldId id="465" r:id="rId15"/>
-    <p:sldId id="466" r:id="rId16"/>
+    <p:sldId id="476" r:id="rId7"/>
+    <p:sldId id="462" r:id="rId8"/>
+    <p:sldId id="383" r:id="rId9"/>
+    <p:sldId id="437" r:id="rId10"/>
+    <p:sldId id="468" r:id="rId11"/>
+    <p:sldId id="465" r:id="rId12"/>
+    <p:sldId id="464" r:id="rId13"/>
+    <p:sldId id="278" r:id="rId14"/>
+    <p:sldId id="473" r:id="rId15"/>
+    <p:sldId id="289" r:id="rId16"/>
     <p:sldId id="467" r:id="rId17"/>
     <p:sldId id="469" r:id="rId18"/>
     <p:sldId id="470" r:id="rId19"/>
@@ -7520,7 +7520,7 @@
           <a:p>
             <a:fld id="{D595ECE6-4E62-419D-985C-2BB4944C7615}" type="datetimeFigureOut">
               <a:rPr lang="en-US" smtClean="0"/>
-              <a:t>7/5/2019</a:t>
+              <a:t>7/10/2019</a:t>
             </a:fld>
             <a:endParaRPr lang="en-US"/>
           </a:p>
@@ -7915,7 +7915,10 @@
           <a:bodyPr/>
           <a:lstStyle/>
           <a:p>
-            <a:endParaRPr lang="en-US" dirty="0"/>
+            <a:r>
+              <a:rPr lang="en-US" dirty="0"/>
+              <a:t>Mention PacBio and DADA2 shown good performance for full 16S gene region</a:t>
+            </a:r>
           </a:p>
         </p:txBody>
       </p:sp>
@@ -7926,7 +7929,7 @@
             <a:spLocks noGrp="1"/>
           </p:cNvSpPr>
           <p:nvPr>
-            <p:ph type="sldNum" sz="quarter" idx="10"/>
+            <p:ph type="sldNum" sz="quarter" idx="5"/>
           </p:nvPr>
         </p:nvSpPr>
         <p:spPr/>
@@ -7935,17 +7938,26 @@
           <a:lstStyle/>
           <a:p>
             <a:fld id="{A43DB8C3-0E23-4872-A5D5-AEFCEEC106B6}" type="slidenum">
-              <a:rPr lang="en-US" smtClean="0"/>
-              <a:t>5</a:t>
+              <a:rPr lang="en-US" smtClean="0">
+                <a:solidFill>
+                  <a:prstClr val="black"/>
+                </a:solidFill>
+              </a:rPr>
+              <a:pPr/>
+              <a:t>4</a:t>
             </a:fld>
-            <a:endParaRPr lang="en-US"/>
+            <a:endParaRPr lang="en-US">
+              <a:solidFill>
+                <a:prstClr val="black"/>
+              </a:solidFill>
+            </a:endParaRPr>
           </a:p>
         </p:txBody>
       </p:sp>
     </p:spTree>
     <p:extLst>
       <p:ext uri="{BB962C8B-B14F-4D97-AF65-F5344CB8AC3E}">
-        <p14:creationId xmlns:p14="http://schemas.microsoft.com/office/powerpoint/2010/main" val="669156048"/>
+        <p14:creationId xmlns:p14="http://schemas.microsoft.com/office/powerpoint/2010/main" val="2426899070"/>
       </p:ext>
     </p:extLst>
   </p:cSld>
@@ -8020,7 +8032,91 @@
           <a:p>
             <a:fld id="{A43DB8C3-0E23-4872-A5D5-AEFCEEC106B6}" type="slidenum">
               <a:rPr lang="en-US" smtClean="0"/>
-              <a:t>8</a:t>
+              <a:t>6</a:t>
+            </a:fld>
+            <a:endParaRPr lang="en-US"/>
+          </a:p>
+        </p:txBody>
+      </p:sp>
+    </p:spTree>
+    <p:extLst>
+      <p:ext uri="{BB962C8B-B14F-4D97-AF65-F5344CB8AC3E}">
+        <p14:creationId xmlns:p14="http://schemas.microsoft.com/office/powerpoint/2010/main" val="669156048"/>
+      </p:ext>
+    </p:extLst>
+  </p:cSld>
+  <p:clrMapOvr>
+    <a:masterClrMapping/>
+  </p:clrMapOvr>
+</p:notes>
+</file>
+
+<file path=ppt/notesSlides/notesSlide4.xml><?xml version="1.0" encoding="utf-8"?>
+<p:notes xmlns:a="http://schemas.openxmlformats.org/drawingml/2006/main" xmlns:r="http://schemas.openxmlformats.org/officeDocument/2006/relationships" xmlns:p="http://schemas.openxmlformats.org/presentationml/2006/main">
+  <p:cSld>
+    <p:spTree>
+      <p:nvGrpSpPr>
+        <p:cNvPr id="1" name=""/>
+        <p:cNvGrpSpPr/>
+        <p:nvPr/>
+      </p:nvGrpSpPr>
+      <p:grpSpPr>
+        <a:xfrm>
+          <a:off x="0" y="0"/>
+          <a:ext cx="0" cy="0"/>
+          <a:chOff x="0" y="0"/>
+          <a:chExt cx="0" cy="0"/>
+        </a:xfrm>
+      </p:grpSpPr>
+      <p:sp>
+        <p:nvSpPr>
+          <p:cNvPr id="2" name="Slide Image Placeholder 1"/>
+          <p:cNvSpPr>
+            <a:spLocks noGrp="1" noRot="1" noChangeAspect="1"/>
+          </p:cNvSpPr>
+          <p:nvPr>
+            <p:ph type="sldImg"/>
+          </p:nvPr>
+        </p:nvSpPr>
+        <p:spPr/>
+      </p:sp>
+      <p:sp>
+        <p:nvSpPr>
+          <p:cNvPr id="3" name="Notes Placeholder 2"/>
+          <p:cNvSpPr>
+            <a:spLocks noGrp="1"/>
+          </p:cNvSpPr>
+          <p:nvPr>
+            <p:ph type="body" idx="1"/>
+          </p:nvPr>
+        </p:nvSpPr>
+        <p:spPr/>
+        <p:txBody>
+          <a:bodyPr/>
+          <a:lstStyle/>
+          <a:p>
+            <a:endParaRPr lang="en-US" dirty="0"/>
+          </a:p>
+        </p:txBody>
+      </p:sp>
+      <p:sp>
+        <p:nvSpPr>
+          <p:cNvPr id="4" name="Slide Number Placeholder 3"/>
+          <p:cNvSpPr>
+            <a:spLocks noGrp="1"/>
+          </p:cNvSpPr>
+          <p:nvPr>
+            <p:ph type="sldNum" sz="quarter" idx="10"/>
+          </p:nvPr>
+        </p:nvSpPr>
+        <p:spPr/>
+        <p:txBody>
+          <a:bodyPr/>
+          <a:lstStyle/>
+          <a:p>
+            <a:fld id="{A43DB8C3-0E23-4872-A5D5-AEFCEEC106B6}" type="slidenum">
+              <a:rPr lang="en-US" smtClean="0"/>
+              <a:t>10</a:t>
             </a:fld>
             <a:endParaRPr lang="en-US"/>
           </a:p>
@@ -8039,7 +8135,7 @@
 </p:notes>
 </file>
 
-<file path=ppt/notesSlides/notesSlide4.xml><?xml version="1.0" encoding="utf-8"?>
+<file path=ppt/notesSlides/notesSlide5.xml><?xml version="1.0" encoding="utf-8"?>
 <p:notes xmlns:a="http://schemas.openxmlformats.org/drawingml/2006/main" xmlns:r="http://schemas.openxmlformats.org/officeDocument/2006/relationships" xmlns:p="http://schemas.openxmlformats.org/presentationml/2006/main">
   <p:cSld>
     <p:spTree>
@@ -8264,7 +8360,7 @@
           <a:p>
             <a:fld id="{E953123B-8704-40E9-8C29-F27E7A9C1DC6}" type="datetimeFigureOut">
               <a:rPr lang="en-US" smtClean="0"/>
-              <a:t>7/5/2019</a:t>
+              <a:t>7/10/2019</a:t>
             </a:fld>
             <a:endParaRPr lang="en-US"/>
           </a:p>
@@ -8432,7 +8528,7 @@
           <a:p>
             <a:fld id="{E953123B-8704-40E9-8C29-F27E7A9C1DC6}" type="datetimeFigureOut">
               <a:rPr lang="en-US" smtClean="0"/>
-              <a:t>7/5/2019</a:t>
+              <a:t>7/10/2019</a:t>
             </a:fld>
             <a:endParaRPr lang="en-US"/>
           </a:p>
@@ -8610,7 +8706,7 @@
           <a:p>
             <a:fld id="{E953123B-8704-40E9-8C29-F27E7A9C1DC6}" type="datetimeFigureOut">
               <a:rPr lang="en-US" smtClean="0"/>
-              <a:t>7/5/2019</a:t>
+              <a:t>7/10/2019</a:t>
             </a:fld>
             <a:endParaRPr lang="en-US"/>
           </a:p>
@@ -8726,7 +8822,7 @@
                 </a:solidFill>
               </a:rPr>
               <a:pPr/>
-              <a:t>7/5/2019</a:t>
+              <a:t>7/10/2019</a:t>
             </a:fld>
             <a:endParaRPr lang="en-US">
               <a:solidFill>
@@ -8995,7 +9091,7 @@
                 </a:solidFill>
               </a:rPr>
               <a:pPr/>
-              <a:t>7/5/2019</a:t>
+              <a:t>7/10/2019</a:t>
             </a:fld>
             <a:endParaRPr lang="en-US">
               <a:solidFill>
@@ -9312,7 +9408,7 @@
                 </a:solidFill>
               </a:rPr>
               <a:pPr/>
-              <a:t>7/5/2019</a:t>
+              <a:t>7/10/2019</a:t>
             </a:fld>
             <a:endParaRPr lang="en-US">
               <a:solidFill>
@@ -9486,7 +9582,7 @@
                 </a:solidFill>
               </a:rPr>
               <a:pPr/>
-              <a:t>7/5/2019</a:t>
+              <a:t>7/10/2019</a:t>
             </a:fld>
             <a:endParaRPr lang="en-US">
               <a:solidFill>
@@ -9780,7 +9876,7 @@
                 </a:solidFill>
               </a:rPr>
               <a:pPr/>
-              <a:t>7/5/2019</a:t>
+              <a:t>7/10/2019</a:t>
             </a:fld>
             <a:endParaRPr lang="en-US">
               <a:solidFill>
@@ -10075,7 +10171,7 @@
                 </a:solidFill>
               </a:rPr>
               <a:pPr/>
-              <a:t>7/5/2019</a:t>
+              <a:t>7/10/2019</a:t>
             </a:fld>
             <a:endParaRPr lang="en-US">
               <a:solidFill>
@@ -10232,7 +10328,7 @@
           <a:p>
             <a:fld id="{E953123B-8704-40E9-8C29-F27E7A9C1DC6}" type="datetimeFigureOut">
               <a:rPr lang="en-US" smtClean="0"/>
-              <a:t>7/5/2019</a:t>
+              <a:t>7/10/2019</a:t>
             </a:fld>
             <a:endParaRPr lang="en-US"/>
           </a:p>
@@ -10477,7 +10573,7 @@
           <a:p>
             <a:fld id="{E953123B-8704-40E9-8C29-F27E7A9C1DC6}" type="datetimeFigureOut">
               <a:rPr lang="en-US" smtClean="0"/>
-              <a:t>7/5/2019</a:t>
+              <a:t>7/10/2019</a:t>
             </a:fld>
             <a:endParaRPr lang="en-US"/>
           </a:p>
@@ -10706,7 +10802,7 @@
           <a:p>
             <a:fld id="{E953123B-8704-40E9-8C29-F27E7A9C1DC6}" type="datetimeFigureOut">
               <a:rPr lang="en-US" smtClean="0"/>
-              <a:t>7/5/2019</a:t>
+              <a:t>7/10/2019</a:t>
             </a:fld>
             <a:endParaRPr lang="en-US"/>
           </a:p>
@@ -11070,7 +11166,7 @@
           <a:p>
             <a:fld id="{E953123B-8704-40E9-8C29-F27E7A9C1DC6}" type="datetimeFigureOut">
               <a:rPr lang="en-US" smtClean="0"/>
-              <a:t>7/5/2019</a:t>
+              <a:t>7/10/2019</a:t>
             </a:fld>
             <a:endParaRPr lang="en-US"/>
           </a:p>
@@ -11187,7 +11283,7 @@
           <a:p>
             <a:fld id="{E953123B-8704-40E9-8C29-F27E7A9C1DC6}" type="datetimeFigureOut">
               <a:rPr lang="en-US" smtClean="0"/>
-              <a:t>7/5/2019</a:t>
+              <a:t>7/10/2019</a:t>
             </a:fld>
             <a:endParaRPr lang="en-US"/>
           </a:p>
@@ -11282,7 +11378,7 @@
           <a:p>
             <a:fld id="{E953123B-8704-40E9-8C29-F27E7A9C1DC6}" type="datetimeFigureOut">
               <a:rPr lang="en-US" smtClean="0"/>
-              <a:t>7/5/2019</a:t>
+              <a:t>7/10/2019</a:t>
             </a:fld>
             <a:endParaRPr lang="en-US"/>
           </a:p>
@@ -11557,7 +11653,7 @@
           <a:p>
             <a:fld id="{E953123B-8704-40E9-8C29-F27E7A9C1DC6}" type="datetimeFigureOut">
               <a:rPr lang="en-US" smtClean="0"/>
-              <a:t>7/5/2019</a:t>
+              <a:t>7/10/2019</a:t>
             </a:fld>
             <a:endParaRPr lang="en-US"/>
           </a:p>
@@ -11809,7 +11905,7 @@
           <a:p>
             <a:fld id="{E953123B-8704-40E9-8C29-F27E7A9C1DC6}" type="datetimeFigureOut">
               <a:rPr lang="en-US" smtClean="0"/>
-              <a:t>7/5/2019</a:t>
+              <a:t>7/10/2019</a:t>
             </a:fld>
             <a:endParaRPr lang="en-US"/>
           </a:p>
@@ -12020,7 +12116,7 @@
           <a:p>
             <a:fld id="{E953123B-8704-40E9-8C29-F27E7A9C1DC6}" type="datetimeFigureOut">
               <a:rPr lang="en-US" smtClean="0"/>
-              <a:t>7/5/2019</a:t>
+              <a:t>7/10/2019</a:t>
             </a:fld>
             <a:endParaRPr lang="en-US"/>
           </a:p>
@@ -12574,7 +12670,7 @@
                 </a:solidFill>
               </a:rPr>
               <a:pPr/>
-              <a:t>7/5/2019</a:t>
+              <a:t>7/10/2019</a:t>
             </a:fld>
             <a:endParaRPr lang="en-US">
               <a:solidFill>
@@ -13121,7 +13217,7 @@
                 </a:solidFill>
               </a:rPr>
               <a:pPr/>
-              <a:t>7/5/2019</a:t>
+              <a:t>7/10/2019</a:t>
             </a:fld>
             <a:endParaRPr lang="en-US">
               <a:solidFill>
@@ -13683,6 +13779,257 @@
       </p:grpSpPr>
       <p:sp>
         <p:nvSpPr>
+          <p:cNvPr id="2" name="Title 1"/>
+          <p:cNvSpPr>
+            <a:spLocks noGrp="1"/>
+          </p:cNvSpPr>
+          <p:nvPr>
+            <p:ph type="title"/>
+          </p:nvPr>
+        </p:nvSpPr>
+        <p:spPr>
+          <a:xfrm>
+            <a:off x="292608" y="365125"/>
+            <a:ext cx="11649456" cy="1325563"/>
+          </a:xfrm>
+        </p:spPr>
+        <p:txBody>
+          <a:bodyPr/>
+          <a:lstStyle/>
+          <a:p>
+            <a:pPr algn="ctr"/>
+            <a:r>
+              <a:rPr lang="en-US" dirty="0"/>
+              <a:t>Common Steps in Amplicon Denoising Pipelines</a:t>
+            </a:r>
+          </a:p>
+        </p:txBody>
+      </p:sp>
+      <p:graphicFrame>
+        <p:nvGraphicFramePr>
+          <p:cNvPr id="5" name="Content Placeholder 4"/>
+          <p:cNvGraphicFramePr>
+            <a:graphicFrameLocks noGrp="1"/>
+          </p:cNvGraphicFramePr>
+          <p:nvPr>
+            <p:ph idx="1"/>
+            <p:extLst>
+              <p:ext uri="{D42A27DB-BD31-4B8C-83A1-F6EECF244321}">
+                <p14:modId xmlns:p14="http://schemas.microsoft.com/office/powerpoint/2010/main" val="1065096929"/>
+              </p:ext>
+            </p:extLst>
+          </p:nvPr>
+        </p:nvGraphicFramePr>
+        <p:xfrm>
+          <a:off x="838200" y="1825624"/>
+          <a:ext cx="10515600" cy="4630039"/>
+        </p:xfrm>
+        <a:graphic>
+          <a:graphicData uri="http://schemas.openxmlformats.org/drawingml/2006/diagram">
+            <dgm:relIds xmlns:dgm="http://schemas.openxmlformats.org/drawingml/2006/diagram" xmlns:r="http://schemas.openxmlformats.org/officeDocument/2006/relationships" r:dm="rId3" r:lo="rId4" r:qs="rId5" r:cs="rId6"/>
+          </a:graphicData>
+        </a:graphic>
+      </p:graphicFrame>
+    </p:spTree>
+    <p:extLst>
+      <p:ext uri="{BB962C8B-B14F-4D97-AF65-F5344CB8AC3E}">
+        <p14:creationId xmlns:p14="http://schemas.microsoft.com/office/powerpoint/2010/main" val="1218211399"/>
+      </p:ext>
+    </p:extLst>
+  </p:cSld>
+  <p:clrMapOvr>
+    <a:masterClrMapping/>
+  </p:clrMapOvr>
+  <p:timing>
+    <p:tnLst>
+      <p:par>
+        <p:cTn id="1" dur="indefinite" restart="never" nodeType="tmRoot"/>
+      </p:par>
+    </p:tnLst>
+  </p:timing>
+</p:sld>
+</file>
+
+<file path=ppt/slides/slide11.xml><?xml version="1.0" encoding="utf-8"?>
+<p:sld xmlns:a="http://schemas.openxmlformats.org/drawingml/2006/main" xmlns:r="http://schemas.openxmlformats.org/officeDocument/2006/relationships" xmlns:p="http://schemas.openxmlformats.org/presentationml/2006/main">
+  <p:cSld>
+    <p:spTree>
+      <p:nvGrpSpPr>
+        <p:cNvPr id="1" name=""/>
+        <p:cNvGrpSpPr/>
+        <p:nvPr/>
+      </p:nvGrpSpPr>
+      <p:grpSpPr>
+        <a:xfrm>
+          <a:off x="0" y="0"/>
+          <a:ext cx="0" cy="0"/>
+          <a:chOff x="0" y="0"/>
+          <a:chExt cx="0" cy="0"/>
+        </a:xfrm>
+      </p:grpSpPr>
+      <p:sp>
+        <p:nvSpPr>
+          <p:cNvPr id="2" name="Title 1"/>
+          <p:cNvSpPr>
+            <a:spLocks noGrp="1"/>
+          </p:cNvSpPr>
+          <p:nvPr>
+            <p:ph type="title"/>
+          </p:nvPr>
+        </p:nvSpPr>
+        <p:spPr>
+          <a:xfrm>
+            <a:off x="687977" y="365125"/>
+            <a:ext cx="10763793" cy="1325563"/>
+          </a:xfrm>
+        </p:spPr>
+        <p:txBody>
+          <a:bodyPr/>
+          <a:lstStyle/>
+          <a:p>
+            <a:pPr algn="ctr"/>
+            <a:r>
+              <a:rPr lang="en-US" dirty="0"/>
+              <a:t>Managing Data Structures with Phyloseq</a:t>
+            </a:r>
+          </a:p>
+        </p:txBody>
+      </p:sp>
+      <p:pic>
+        <p:nvPicPr>
+          <p:cNvPr id="4" name="Content Placeholder 3"/>
+          <p:cNvPicPr>
+            <a:picLocks noGrp="1" noChangeAspect="1"/>
+          </p:cNvPicPr>
+          <p:nvPr>
+            <p:ph idx="1"/>
+          </p:nvPr>
+        </p:nvPicPr>
+        <p:blipFill>
+          <a:blip r:embed="rId2" cstate="print">
+            <a:extLst>
+              <a:ext uri="{28A0092B-C50C-407E-A947-70E740481C1C}">
+                <a14:useLocalDpi xmlns:a14="http://schemas.microsoft.com/office/drawing/2010/main" val="0"/>
+              </a:ext>
+            </a:extLst>
+          </a:blip>
+          <a:stretch>
+            <a:fillRect/>
+          </a:stretch>
+        </p:blipFill>
+        <p:spPr>
+          <a:xfrm>
+            <a:off x="1588111" y="1690688"/>
+            <a:ext cx="8693856" cy="4300809"/>
+          </a:xfrm>
+        </p:spPr>
+      </p:pic>
+      <p:sp>
+        <p:nvSpPr>
+          <p:cNvPr id="5" name="TextBox 4"/>
+          <p:cNvSpPr txBox="1"/>
+          <p:nvPr/>
+        </p:nvSpPr>
+        <p:spPr>
+          <a:xfrm>
+            <a:off x="9366216" y="6392091"/>
+            <a:ext cx="2825784" cy="369332"/>
+          </a:xfrm>
+          <a:prstGeom prst="rect">
+            <a:avLst/>
+          </a:prstGeom>
+          <a:noFill/>
+        </p:spPr>
+        <p:txBody>
+          <a:bodyPr wrap="square" rtlCol="0">
+            <a:spAutoFit/>
+          </a:bodyPr>
+          <a:lstStyle/>
+          <a:p>
+            <a:r>
+              <a:rPr lang="en-US" dirty="0"/>
+              <a:t>McMurdie, </a:t>
+            </a:r>
+            <a:r>
+              <a:rPr lang="en-US" i="1" dirty="0"/>
+              <a:t>PLOS ONE</a:t>
+            </a:r>
+            <a:r>
+              <a:rPr lang="en-US" dirty="0"/>
+              <a:t>, 2013</a:t>
+            </a:r>
+          </a:p>
+        </p:txBody>
+      </p:sp>
+      <p:pic>
+        <p:nvPicPr>
+          <p:cNvPr id="6" name="Content Placeholder 3"/>
+          <p:cNvPicPr>
+            <a:picLocks noChangeAspect="1"/>
+          </p:cNvPicPr>
+          <p:nvPr/>
+        </p:nvPicPr>
+        <p:blipFill>
+          <a:blip r:embed="rId3" cstate="print">
+            <a:extLst>
+              <a:ext uri="{28A0092B-C50C-407E-A947-70E740481C1C}">
+                <a14:useLocalDpi xmlns:a14="http://schemas.microsoft.com/office/drawing/2010/main" val="0"/>
+              </a:ext>
+            </a:extLst>
+          </a:blip>
+          <a:stretch>
+            <a:fillRect/>
+          </a:stretch>
+        </p:blipFill>
+        <p:spPr>
+          <a:xfrm>
+            <a:off x="10682430" y="365125"/>
+            <a:ext cx="1217134" cy="943111"/>
+          </a:xfrm>
+          <a:prstGeom prst="rect">
+            <a:avLst/>
+          </a:prstGeom>
+        </p:spPr>
+      </p:pic>
+    </p:spTree>
+    <p:extLst>
+      <p:ext uri="{BB962C8B-B14F-4D97-AF65-F5344CB8AC3E}">
+        <p14:creationId xmlns:p14="http://schemas.microsoft.com/office/powerpoint/2010/main" val="3069183188"/>
+      </p:ext>
+    </p:extLst>
+  </p:cSld>
+  <p:clrMapOvr>
+    <a:masterClrMapping/>
+  </p:clrMapOvr>
+  <p:timing>
+    <p:tnLst>
+      <p:par>
+        <p:cTn id="1" dur="indefinite" restart="never" nodeType="tmRoot"/>
+      </p:par>
+    </p:tnLst>
+  </p:timing>
+</p:sld>
+</file>
+
+<file path=ppt/slides/slide12.xml><?xml version="1.0" encoding="utf-8"?>
+<p:sld xmlns:a="http://schemas.openxmlformats.org/drawingml/2006/main" xmlns:r="http://schemas.openxmlformats.org/officeDocument/2006/relationships" xmlns:p="http://schemas.openxmlformats.org/presentationml/2006/main">
+  <p:cSld>
+    <p:spTree>
+      <p:nvGrpSpPr>
+        <p:cNvPr id="1" name=""/>
+        <p:cNvGrpSpPr/>
+        <p:nvPr/>
+      </p:nvGrpSpPr>
+      <p:grpSpPr>
+        <a:xfrm>
+          <a:off x="0" y="0"/>
+          <a:ext cx="0" cy="0"/>
+          <a:chOff x="0" y="0"/>
+          <a:chExt cx="0" cy="0"/>
+        </a:xfrm>
+      </p:grpSpPr>
+      <p:sp>
+        <p:nvSpPr>
           <p:cNvPr id="3" name="Content Placeholder 2"/>
           <p:cNvSpPr>
             <a:spLocks noGrp="1"/>
@@ -13791,7 +14138,7 @@
 </p:sld>
 </file>
 
-<file path=ppt/slides/slide11.xml><?xml version="1.0" encoding="utf-8"?>
+<file path=ppt/slides/slide13.xml><?xml version="1.0" encoding="utf-8"?>
 <p:sld xmlns:a="http://schemas.openxmlformats.org/drawingml/2006/main" xmlns:r="http://schemas.openxmlformats.org/officeDocument/2006/relationships" xmlns:p="http://schemas.openxmlformats.org/presentationml/2006/main">
   <p:cSld>
     <p:spTree>
@@ -13991,347 +14338,6 @@
     <p:extLst>
       <p:ext uri="{BB962C8B-B14F-4D97-AF65-F5344CB8AC3E}">
         <p14:creationId xmlns:p14="http://schemas.microsoft.com/office/powerpoint/2010/main" val="2476921870"/>
-      </p:ext>
-    </p:extLst>
-  </p:cSld>
-  <p:clrMapOvr>
-    <a:masterClrMapping/>
-  </p:clrMapOvr>
-  <p:timing>
-    <p:tnLst>
-      <p:par>
-        <p:cTn id="1" dur="indefinite" restart="never" nodeType="tmRoot"/>
-      </p:par>
-    </p:tnLst>
-  </p:timing>
-</p:sld>
-</file>
-
-<file path=ppt/slides/slide12.xml><?xml version="1.0" encoding="utf-8"?>
-<p:sld xmlns:a="http://schemas.openxmlformats.org/drawingml/2006/main" xmlns:r="http://schemas.openxmlformats.org/officeDocument/2006/relationships" xmlns:p="http://schemas.openxmlformats.org/presentationml/2006/main">
-  <p:cSld>
-    <p:spTree>
-      <p:nvGrpSpPr>
-        <p:cNvPr id="1" name=""/>
-        <p:cNvGrpSpPr/>
-        <p:nvPr/>
-      </p:nvGrpSpPr>
-      <p:grpSpPr>
-        <a:xfrm>
-          <a:off x="0" y="0"/>
-          <a:ext cx="0" cy="0"/>
-          <a:chOff x="0" y="0"/>
-          <a:chExt cx="0" cy="0"/>
-        </a:xfrm>
-      </p:grpSpPr>
-      <p:sp>
-        <p:nvSpPr>
-          <p:cNvPr id="2" name="Title 1"/>
-          <p:cNvSpPr>
-            <a:spLocks noGrp="1"/>
-          </p:cNvSpPr>
-          <p:nvPr>
-            <p:ph type="title"/>
-          </p:nvPr>
-        </p:nvSpPr>
-        <p:spPr/>
-        <p:txBody>
-          <a:bodyPr/>
-          <a:lstStyle/>
-          <a:p>
-            <a:pPr algn="ctr"/>
-            <a:r>
-              <a:rPr lang="en-US" dirty="0"/>
-              <a:t>Filtering Low Quality Reads</a:t>
-            </a:r>
-          </a:p>
-        </p:txBody>
-      </p:sp>
-      <p:sp>
-        <p:nvSpPr>
-          <p:cNvPr id="3" name="Content Placeholder 2"/>
-          <p:cNvSpPr>
-            <a:spLocks noGrp="1"/>
-          </p:cNvSpPr>
-          <p:nvPr>
-            <p:ph idx="1"/>
-          </p:nvPr>
-        </p:nvSpPr>
-        <p:spPr>
-          <a:xfrm>
-            <a:off x="838200" y="1825624"/>
-            <a:ext cx="10515600" cy="4785487"/>
-          </a:xfrm>
-        </p:spPr>
-        <p:txBody>
-          <a:bodyPr>
-            <a:normAutofit fontScale="85000" lnSpcReduction="20000"/>
-          </a:bodyPr>
-          <a:lstStyle/>
-          <a:p>
-            <a:r>
-              <a:rPr lang="en-US" dirty="0"/>
-              <a:t>Low quality sequences containing a higher number of probable errors are typically removed</a:t>
-            </a:r>
-          </a:p>
-          <a:p>
-            <a:pPr lvl="1"/>
-            <a:r>
-              <a:rPr lang="en-US" dirty="0"/>
-              <a:t>If not, can (will) inflate false positive rate</a:t>
-            </a:r>
-          </a:p>
-          <a:p>
-            <a:endParaRPr lang="en-US" dirty="0"/>
-          </a:p>
-          <a:p>
-            <a:r>
-              <a:rPr lang="en-US" dirty="0"/>
-              <a:t>Illumina provides a quality score providing the </a:t>
-            </a:r>
-          </a:p>
-          <a:p>
-            <a:pPr marL="0" indent="0">
-              <a:buNone/>
-            </a:pPr>
-            <a:r>
-              <a:rPr lang="en-US" dirty="0"/>
-              <a:t>   probability of an error for each base call</a:t>
-            </a:r>
-          </a:p>
-          <a:p>
-            <a:endParaRPr lang="en-US" dirty="0"/>
-          </a:p>
-          <a:p>
-            <a:r>
-              <a:rPr lang="en-US" dirty="0"/>
-              <a:t>Expected number of errors is: </a:t>
-            </a:r>
-          </a:p>
-          <a:p>
-            <a:pPr lvl="1"/>
-            <a:r>
-              <a:rPr lang="en-US" dirty="0"/>
-              <a:t>E* = floor(sum(prob. error for each base))</a:t>
-            </a:r>
-          </a:p>
-          <a:p>
-            <a:pPr lvl="1"/>
-            <a:r>
-              <a:rPr lang="en-US" dirty="0"/>
-              <a:t>Proper calc. since error prob. is cumulative</a:t>
-            </a:r>
-          </a:p>
-          <a:p>
-            <a:pPr lvl="1"/>
-            <a:r>
-              <a:rPr lang="en-US" dirty="0">
-                <a:hlinkClick r:id="rId2"/>
-              </a:rPr>
-              <a:t>https://drive5.com/usearch/manual/exp_errs.html</a:t>
-            </a:r>
-            <a:endParaRPr lang="en-US" dirty="0"/>
-          </a:p>
-          <a:p>
-            <a:pPr lvl="1"/>
-            <a:endParaRPr lang="en-US" dirty="0"/>
-          </a:p>
-          <a:p>
-            <a:r>
-              <a:rPr lang="en-US" dirty="0"/>
-              <a:t>Typically filter reads with &gt;1 or 2 expected errors or any ambiguous bases</a:t>
-            </a:r>
-          </a:p>
-          <a:p>
-            <a:pPr lvl="1"/>
-            <a:r>
-              <a:rPr lang="en-US" dirty="0"/>
-              <a:t>Trim reads where the quality profile crashes to help retain more reads </a:t>
-            </a:r>
-          </a:p>
-          <a:p>
-            <a:endParaRPr lang="en-US" dirty="0"/>
-          </a:p>
-        </p:txBody>
-      </p:sp>
-      <p:pic>
-        <p:nvPicPr>
-          <p:cNvPr id="5" name="Picture 4"/>
-          <p:cNvPicPr>
-            <a:picLocks noChangeAspect="1"/>
-          </p:cNvPicPr>
-          <p:nvPr/>
-        </p:nvPicPr>
-        <p:blipFill>
-          <a:blip r:embed="rId3"/>
-          <a:stretch>
-            <a:fillRect/>
-          </a:stretch>
-        </p:blipFill>
-        <p:spPr>
-          <a:xfrm>
-            <a:off x="7086600" y="2873686"/>
-            <a:ext cx="4904232" cy="2400878"/>
-          </a:xfrm>
-          <a:prstGeom prst="rect">
-            <a:avLst/>
-          </a:prstGeom>
-        </p:spPr>
-      </p:pic>
-      <p:sp>
-        <p:nvSpPr>
-          <p:cNvPr id="6" name="TextBox 5"/>
-          <p:cNvSpPr txBox="1"/>
-          <p:nvPr/>
-        </p:nvSpPr>
-        <p:spPr>
-          <a:xfrm>
-            <a:off x="3346704" y="6457562"/>
-            <a:ext cx="9144000" cy="338554"/>
-          </a:xfrm>
-          <a:prstGeom prst="rect">
-            <a:avLst/>
-          </a:prstGeom>
-          <a:noFill/>
-        </p:spPr>
-        <p:txBody>
-          <a:bodyPr wrap="square" rtlCol="0">
-            <a:spAutoFit/>
-          </a:bodyPr>
-          <a:lstStyle/>
-          <a:p>
-            <a:r>
-              <a:rPr lang="en-US" sz="1600" dirty="0">
-                <a:hlinkClick r:id="rId4"/>
-              </a:rPr>
-              <a:t>https://www.illumina.com/documents/products/technotes/technote_understanding_quality_scores.pdf</a:t>
-            </a:r>
-            <a:endParaRPr lang="en-US" sz="1600" dirty="0"/>
-          </a:p>
-        </p:txBody>
-      </p:sp>
-    </p:spTree>
-    <p:extLst>
-      <p:ext uri="{BB962C8B-B14F-4D97-AF65-F5344CB8AC3E}">
-        <p14:creationId xmlns:p14="http://schemas.microsoft.com/office/powerpoint/2010/main" val="238426400"/>
-      </p:ext>
-    </p:extLst>
-  </p:cSld>
-  <p:clrMapOvr>
-    <a:masterClrMapping/>
-  </p:clrMapOvr>
-  <p:timing>
-    <p:tnLst>
-      <p:par>
-        <p:cTn id="1" dur="indefinite" restart="never" nodeType="tmRoot"/>
-      </p:par>
-    </p:tnLst>
-  </p:timing>
-</p:sld>
-</file>
-
-<file path=ppt/slides/slide13.xml><?xml version="1.0" encoding="utf-8"?>
-<p:sld xmlns:a="http://schemas.openxmlformats.org/drawingml/2006/main" xmlns:r="http://schemas.openxmlformats.org/officeDocument/2006/relationships" xmlns:p="http://schemas.openxmlformats.org/presentationml/2006/main">
-  <p:cSld>
-    <p:spTree>
-      <p:nvGrpSpPr>
-        <p:cNvPr id="1" name=""/>
-        <p:cNvGrpSpPr/>
-        <p:nvPr/>
-      </p:nvGrpSpPr>
-      <p:grpSpPr>
-        <a:xfrm>
-          <a:off x="0" y="0"/>
-          <a:ext cx="0" cy="0"/>
-          <a:chOff x="0" y="0"/>
-          <a:chExt cx="0" cy="0"/>
-        </a:xfrm>
-      </p:grpSpPr>
-      <p:sp>
-        <p:nvSpPr>
-          <p:cNvPr id="4" name="Title 3"/>
-          <p:cNvSpPr>
-            <a:spLocks noGrp="1"/>
-          </p:cNvSpPr>
-          <p:nvPr>
-            <p:ph type="title"/>
-          </p:nvPr>
-        </p:nvSpPr>
-        <p:spPr/>
-        <p:txBody>
-          <a:bodyPr/>
-          <a:lstStyle/>
-          <a:p>
-            <a:pPr algn="ctr"/>
-            <a:r>
-              <a:rPr lang="en-US" dirty="0"/>
-              <a:t>Inspecting Quality Profiles</a:t>
-            </a:r>
-          </a:p>
-        </p:txBody>
-      </p:sp>
-      <p:pic>
-        <p:nvPicPr>
-          <p:cNvPr id="7" name="Content Placeholder 6"/>
-          <p:cNvPicPr>
-            <a:picLocks noGrp="1" noChangeAspect="1"/>
-          </p:cNvPicPr>
-          <p:nvPr>
-            <p:ph sz="half" idx="1"/>
-          </p:nvPr>
-        </p:nvPicPr>
-        <p:blipFill>
-          <a:blip r:embed="rId2" cstate="print">
-            <a:extLst>
-              <a:ext uri="{28A0092B-C50C-407E-A947-70E740481C1C}">
-                <a14:useLocalDpi xmlns:a14="http://schemas.microsoft.com/office/drawing/2010/main" val="0"/>
-              </a:ext>
-            </a:extLst>
-          </a:blip>
-          <a:stretch>
-            <a:fillRect/>
-          </a:stretch>
-        </p:blipFill>
-        <p:spPr>
-          <a:xfrm>
-            <a:off x="838200" y="2058194"/>
-            <a:ext cx="5181600" cy="3886199"/>
-          </a:xfrm>
-        </p:spPr>
-      </p:pic>
-      <p:pic>
-        <p:nvPicPr>
-          <p:cNvPr id="8" name="Content Placeholder 7"/>
-          <p:cNvPicPr>
-            <a:picLocks noGrp="1" noChangeAspect="1"/>
-          </p:cNvPicPr>
-          <p:nvPr>
-            <p:ph sz="half" idx="2"/>
-          </p:nvPr>
-        </p:nvPicPr>
-        <p:blipFill>
-          <a:blip r:embed="rId3" cstate="print">
-            <a:extLst>
-              <a:ext uri="{28A0092B-C50C-407E-A947-70E740481C1C}">
-                <a14:useLocalDpi xmlns:a14="http://schemas.microsoft.com/office/drawing/2010/main" val="0"/>
-              </a:ext>
-            </a:extLst>
-          </a:blip>
-          <a:stretch>
-            <a:fillRect/>
-          </a:stretch>
-        </p:blipFill>
-        <p:spPr>
-          <a:xfrm>
-            <a:off x="6172200" y="2058194"/>
-            <a:ext cx="5181600" cy="3886199"/>
-          </a:xfrm>
-        </p:spPr>
-      </p:pic>
-    </p:spTree>
-    <p:extLst>
-      <p:ext uri="{BB962C8B-B14F-4D97-AF65-F5344CB8AC3E}">
-        <p14:creationId xmlns:p14="http://schemas.microsoft.com/office/powerpoint/2010/main" val="1860667171"/>
       </p:ext>
     </p:extLst>
   </p:cSld>
@@ -15496,15 +15502,7 @@
             <a:pPr lvl="1"/>
             <a:r>
               <a:rPr lang="en-US" dirty="0" smtClean="0"/>
-              <a:t>Present a few </a:t>
-            </a:r>
-            <a:r>
-              <a:rPr lang="en-US" dirty="0" err="1" smtClean="0"/>
-              <a:t>differnt</a:t>
-            </a:r>
-            <a:r>
-              <a:rPr lang="en-US" dirty="0" smtClean="0"/>
-              <a:t> </a:t>
+              <a:t>Present a few different </a:t>
             </a:r>
             <a:r>
               <a:rPr lang="en-US" dirty="0"/>
@@ -15823,6 +15821,448 @@
       </p:grpSpPr>
       <p:sp>
         <p:nvSpPr>
+          <p:cNvPr id="4" name="Title 3"/>
+          <p:cNvSpPr>
+            <a:spLocks noGrp="1"/>
+          </p:cNvSpPr>
+          <p:nvPr>
+            <p:ph type="title"/>
+          </p:nvPr>
+        </p:nvSpPr>
+        <p:spPr/>
+        <p:txBody>
+          <a:bodyPr/>
+          <a:lstStyle/>
+          <a:p>
+            <a:pPr algn="ctr"/>
+            <a:r>
+              <a:rPr lang="en-US" dirty="0" smtClean="0"/>
+              <a:t>Why Sequence 16S rRNA Gene?</a:t>
+            </a:r>
+            <a:endParaRPr lang="en-US" dirty="0"/>
+          </a:p>
+        </p:txBody>
+      </p:sp>
+      <p:sp>
+        <p:nvSpPr>
+          <p:cNvPr id="5" name="Content Placeholder 4"/>
+          <p:cNvSpPr>
+            <a:spLocks noGrp="1"/>
+          </p:cNvSpPr>
+          <p:nvPr>
+            <p:ph idx="1"/>
+          </p:nvPr>
+        </p:nvSpPr>
+        <p:spPr/>
+        <p:txBody>
+          <a:bodyPr/>
+          <a:lstStyle/>
+          <a:p>
+            <a:r>
+              <a:rPr lang="en-US" dirty="0" smtClean="0"/>
+              <a:t>Present across prokaryote genomes </a:t>
+            </a:r>
+            <a:r>
+              <a:rPr lang="en-US" sz="1800" dirty="0" smtClean="0"/>
+              <a:t>(housekeeping gene) </a:t>
+            </a:r>
+          </a:p>
+          <a:p>
+            <a:r>
+              <a:rPr lang="en-US" dirty="0" smtClean="0"/>
+              <a:t>Has </a:t>
+            </a:r>
+            <a:r>
+              <a:rPr lang="en-US" b="1" dirty="0" smtClean="0"/>
+              <a:t>conserved</a:t>
+            </a:r>
+            <a:r>
+              <a:rPr lang="en-US" dirty="0" smtClean="0"/>
+              <a:t> and </a:t>
+            </a:r>
+            <a:r>
+              <a:rPr lang="en-US" b="1" dirty="0" smtClean="0"/>
+              <a:t>hypervariable</a:t>
+            </a:r>
+            <a:r>
+              <a:rPr lang="en-US" dirty="0" smtClean="0"/>
+              <a:t> regions that can be exploited</a:t>
+            </a:r>
+            <a:endParaRPr lang="en-US" dirty="0"/>
+          </a:p>
+          <a:p>
+            <a:r>
+              <a:rPr lang="en-US" dirty="0" smtClean="0"/>
+              <a:t>Used as a “barcode” to discriminate between different organisms</a:t>
+            </a:r>
+            <a:endParaRPr lang="en-US" dirty="0"/>
+          </a:p>
+          <a:p>
+            <a:pPr marL="0" indent="0">
+              <a:buNone/>
+            </a:pPr>
+            <a:endParaRPr lang="en-US" dirty="0"/>
+          </a:p>
+        </p:txBody>
+      </p:sp>
+      <p:grpSp>
+        <p:nvGrpSpPr>
+          <p:cNvPr id="6" name="Group 5"/>
+          <p:cNvGrpSpPr/>
+          <p:nvPr/>
+        </p:nvGrpSpPr>
+        <p:grpSpPr>
+          <a:xfrm>
+            <a:off x="2747176" y="3440281"/>
+            <a:ext cx="6697647" cy="3417719"/>
+            <a:chOff x="2796730" y="3812622"/>
+            <a:chExt cx="5501260" cy="2871619"/>
+          </a:xfrm>
+        </p:grpSpPr>
+        <p:pic>
+          <p:nvPicPr>
+            <p:cNvPr id="7" name="Picture 6"/>
+            <p:cNvPicPr>
+              <a:picLocks noChangeAspect="1"/>
+            </p:cNvPicPr>
+            <p:nvPr/>
+          </p:nvPicPr>
+          <p:blipFill>
+            <a:blip r:embed="rId3">
+              <a:extLst>
+                <a:ext uri="{28A0092B-C50C-407E-A947-70E740481C1C}">
+                  <a14:useLocalDpi xmlns:a14="http://schemas.microsoft.com/office/drawing/2010/main" val="0"/>
+                </a:ext>
+              </a:extLst>
+            </a:blip>
+            <a:stretch>
+              <a:fillRect/>
+            </a:stretch>
+          </p:blipFill>
+          <p:spPr>
+            <a:xfrm>
+              <a:off x="2796730" y="3812622"/>
+              <a:ext cx="5501260" cy="2820832"/>
+            </a:xfrm>
+            <a:prstGeom prst="rect">
+              <a:avLst/>
+            </a:prstGeom>
+          </p:spPr>
+        </p:pic>
+        <p:sp>
+          <p:nvSpPr>
+            <p:cNvPr id="2" name="Rectangle 1"/>
+            <p:cNvSpPr/>
+            <p:nvPr/>
+          </p:nvSpPr>
+          <p:spPr>
+            <a:xfrm>
+              <a:off x="4956048" y="4745736"/>
+              <a:ext cx="1097280" cy="182880"/>
+            </a:xfrm>
+            <a:prstGeom prst="rect">
+              <a:avLst/>
+            </a:prstGeom>
+            <a:solidFill>
+              <a:schemeClr val="bg1"/>
+            </a:solidFill>
+            <a:ln>
+              <a:noFill/>
+            </a:ln>
+          </p:spPr>
+          <p:style>
+            <a:lnRef idx="2">
+              <a:schemeClr val="accent1">
+                <a:shade val="50000"/>
+              </a:schemeClr>
+            </a:lnRef>
+            <a:fillRef idx="1">
+              <a:schemeClr val="accent1"/>
+            </a:fillRef>
+            <a:effectRef idx="0">
+              <a:schemeClr val="accent1"/>
+            </a:effectRef>
+            <a:fontRef idx="minor">
+              <a:schemeClr val="lt1"/>
+            </a:fontRef>
+          </p:style>
+          <p:txBody>
+            <a:bodyPr rtlCol="0" anchor="ctr"/>
+            <a:lstStyle/>
+            <a:p>
+              <a:pPr algn="ctr"/>
+              <a:endParaRPr lang="en-US">
+                <a:solidFill>
+                  <a:prstClr val="white"/>
+                </a:solidFill>
+              </a:endParaRPr>
+            </a:p>
+          </p:txBody>
+        </p:sp>
+        <p:pic>
+          <p:nvPicPr>
+            <p:cNvPr id="3" name="Picture 2"/>
+            <p:cNvPicPr>
+              <a:picLocks noChangeAspect="1"/>
+            </p:cNvPicPr>
+            <p:nvPr/>
+          </p:nvPicPr>
+          <p:blipFill>
+            <a:blip r:embed="rId4"/>
+            <a:stretch>
+              <a:fillRect/>
+            </a:stretch>
+          </p:blipFill>
+          <p:spPr>
+            <a:xfrm>
+              <a:off x="6096000" y="5040142"/>
+              <a:ext cx="1097375" cy="182896"/>
+            </a:xfrm>
+            <a:prstGeom prst="rect">
+              <a:avLst/>
+            </a:prstGeom>
+          </p:spPr>
+        </p:pic>
+        <p:sp>
+          <p:nvSpPr>
+            <p:cNvPr id="8" name="Rectangle 7"/>
+            <p:cNvSpPr/>
+            <p:nvPr/>
+          </p:nvSpPr>
+          <p:spPr>
+            <a:xfrm>
+              <a:off x="6388608" y="5287450"/>
+              <a:ext cx="1097280" cy="182880"/>
+            </a:xfrm>
+            <a:prstGeom prst="rect">
+              <a:avLst/>
+            </a:prstGeom>
+            <a:solidFill>
+              <a:schemeClr val="bg1"/>
+            </a:solidFill>
+            <a:ln>
+              <a:noFill/>
+            </a:ln>
+          </p:spPr>
+          <p:style>
+            <a:lnRef idx="2">
+              <a:schemeClr val="accent1">
+                <a:shade val="50000"/>
+              </a:schemeClr>
+            </a:lnRef>
+            <a:fillRef idx="1">
+              <a:schemeClr val="accent1"/>
+            </a:fillRef>
+            <a:effectRef idx="0">
+              <a:schemeClr val="accent1"/>
+            </a:effectRef>
+            <a:fontRef idx="minor">
+              <a:schemeClr val="lt1"/>
+            </a:fontRef>
+          </p:style>
+          <p:txBody>
+            <a:bodyPr rtlCol="0" anchor="ctr"/>
+            <a:lstStyle/>
+            <a:p>
+              <a:pPr algn="ctr"/>
+              <a:endParaRPr lang="en-US">
+                <a:solidFill>
+                  <a:prstClr val="white"/>
+                </a:solidFill>
+              </a:endParaRPr>
+            </a:p>
+          </p:txBody>
+        </p:sp>
+        <p:sp>
+          <p:nvSpPr>
+            <p:cNvPr id="9" name="Rectangle 8"/>
+            <p:cNvSpPr/>
+            <p:nvPr/>
+          </p:nvSpPr>
+          <p:spPr>
+            <a:xfrm>
+              <a:off x="5940552" y="5605267"/>
+              <a:ext cx="1097280" cy="182880"/>
+            </a:xfrm>
+            <a:prstGeom prst="rect">
+              <a:avLst/>
+            </a:prstGeom>
+            <a:solidFill>
+              <a:schemeClr val="bg1"/>
+            </a:solidFill>
+            <a:ln>
+              <a:noFill/>
+            </a:ln>
+          </p:spPr>
+          <p:style>
+            <a:lnRef idx="2">
+              <a:schemeClr val="accent1">
+                <a:shade val="50000"/>
+              </a:schemeClr>
+            </a:lnRef>
+            <a:fillRef idx="1">
+              <a:schemeClr val="accent1"/>
+            </a:fillRef>
+            <a:effectRef idx="0">
+              <a:schemeClr val="accent1"/>
+            </a:effectRef>
+            <a:fontRef idx="minor">
+              <a:schemeClr val="lt1"/>
+            </a:fontRef>
+          </p:style>
+          <p:txBody>
+            <a:bodyPr rtlCol="0" anchor="ctr"/>
+            <a:lstStyle/>
+            <a:p>
+              <a:pPr algn="ctr"/>
+              <a:endParaRPr lang="en-US">
+                <a:solidFill>
+                  <a:prstClr val="white"/>
+                </a:solidFill>
+              </a:endParaRPr>
+            </a:p>
+          </p:txBody>
+        </p:sp>
+        <p:sp>
+          <p:nvSpPr>
+            <p:cNvPr id="10" name="Rectangle 9"/>
+            <p:cNvSpPr/>
+            <p:nvPr/>
+          </p:nvSpPr>
+          <p:spPr>
+            <a:xfrm>
+              <a:off x="4843272" y="5892509"/>
+              <a:ext cx="1097280" cy="182880"/>
+            </a:xfrm>
+            <a:prstGeom prst="rect">
+              <a:avLst/>
+            </a:prstGeom>
+            <a:solidFill>
+              <a:schemeClr val="bg1"/>
+            </a:solidFill>
+            <a:ln>
+              <a:noFill/>
+            </a:ln>
+          </p:spPr>
+          <p:style>
+            <a:lnRef idx="2">
+              <a:schemeClr val="accent1">
+                <a:shade val="50000"/>
+              </a:schemeClr>
+            </a:lnRef>
+            <a:fillRef idx="1">
+              <a:schemeClr val="accent1"/>
+            </a:fillRef>
+            <a:effectRef idx="0">
+              <a:schemeClr val="accent1"/>
+            </a:effectRef>
+            <a:fontRef idx="minor">
+              <a:schemeClr val="lt1"/>
+            </a:fontRef>
+          </p:style>
+          <p:txBody>
+            <a:bodyPr rtlCol="0" anchor="ctr"/>
+            <a:lstStyle/>
+            <a:p>
+              <a:pPr algn="ctr"/>
+              <a:endParaRPr lang="en-US">
+                <a:solidFill>
+                  <a:prstClr val="white"/>
+                </a:solidFill>
+              </a:endParaRPr>
+            </a:p>
+          </p:txBody>
+        </p:sp>
+        <p:sp>
+          <p:nvSpPr>
+            <p:cNvPr id="11" name="Rectangle 10"/>
+            <p:cNvSpPr/>
+            <p:nvPr/>
+          </p:nvSpPr>
+          <p:spPr>
+            <a:xfrm>
+              <a:off x="4843272" y="6501361"/>
+              <a:ext cx="1097280" cy="182880"/>
+            </a:xfrm>
+            <a:prstGeom prst="rect">
+              <a:avLst/>
+            </a:prstGeom>
+            <a:solidFill>
+              <a:schemeClr val="bg1"/>
+            </a:solidFill>
+            <a:ln>
+              <a:noFill/>
+            </a:ln>
+          </p:spPr>
+          <p:style>
+            <a:lnRef idx="2">
+              <a:schemeClr val="accent1">
+                <a:shade val="50000"/>
+              </a:schemeClr>
+            </a:lnRef>
+            <a:fillRef idx="1">
+              <a:schemeClr val="accent1"/>
+            </a:fillRef>
+            <a:effectRef idx="0">
+              <a:schemeClr val="accent1"/>
+            </a:effectRef>
+            <a:fontRef idx="minor">
+              <a:schemeClr val="lt1"/>
+            </a:fontRef>
+          </p:style>
+          <p:txBody>
+            <a:bodyPr rtlCol="0" anchor="ctr"/>
+            <a:lstStyle/>
+            <a:p>
+              <a:pPr algn="ctr"/>
+              <a:endParaRPr lang="en-US">
+                <a:solidFill>
+                  <a:prstClr val="white"/>
+                </a:solidFill>
+              </a:endParaRPr>
+            </a:p>
+          </p:txBody>
+        </p:sp>
+      </p:grpSp>
+    </p:spTree>
+    <p:extLst>
+      <p:ext uri="{BB962C8B-B14F-4D97-AF65-F5344CB8AC3E}">
+        <p14:creationId xmlns:p14="http://schemas.microsoft.com/office/powerpoint/2010/main" val="948932687"/>
+      </p:ext>
+    </p:extLst>
+  </p:cSld>
+  <p:clrMapOvr>
+    <a:masterClrMapping/>
+  </p:clrMapOvr>
+  <p:timing>
+    <p:tnLst>
+      <p:par>
+        <p:cTn id="1" dur="indefinite" restart="never" nodeType="tmRoot"/>
+      </p:par>
+    </p:tnLst>
+  </p:timing>
+</p:sld>
+</file>
+
+<file path=ppt/slides/slide5.xml><?xml version="1.0" encoding="utf-8"?>
+<p:sld xmlns:a="http://schemas.openxmlformats.org/drawingml/2006/main" xmlns:r="http://schemas.openxmlformats.org/officeDocument/2006/relationships" xmlns:p="http://schemas.openxmlformats.org/presentationml/2006/main">
+  <p:cSld>
+    <p:spTree>
+      <p:nvGrpSpPr>
+        <p:cNvPr id="1" name=""/>
+        <p:cNvGrpSpPr/>
+        <p:nvPr/>
+      </p:nvGrpSpPr>
+      <p:grpSpPr>
+        <a:xfrm>
+          <a:off x="0" y="0"/>
+          <a:ext cx="0" cy="0"/>
+          <a:chOff x="0" y="0"/>
+          <a:chExt cx="0" cy="0"/>
+        </a:xfrm>
+      </p:grpSpPr>
+      <p:sp>
+        <p:nvSpPr>
           <p:cNvPr id="2" name="Title 1"/>
           <p:cNvSpPr>
             <a:spLocks noGrp="1"/>
@@ -15862,7 +16302,7 @@
         </p:spPr>
         <p:txBody>
           <a:bodyPr>
-            <a:normAutofit/>
+            <a:normAutofit lnSpcReduction="10000"/>
           </a:bodyPr>
           <a:lstStyle/>
           <a:p>
@@ -15935,11 +16375,7 @@
             <a:pPr lvl="1"/>
             <a:r>
               <a:rPr lang="en-US" dirty="0" smtClean="0"/>
-              <a:t>Cannot</a:t>
-            </a:r>
-            <a:r>
-              <a:rPr lang="en-US" dirty="0" smtClean="0"/>
-              <a:t> </a:t>
+              <a:t>Cannot </a:t>
             </a:r>
             <a:r>
               <a:rPr lang="en-US" dirty="0"/>
@@ -15947,24 +16383,24 @@
             </a:r>
             <a:r>
               <a:rPr lang="en-US" dirty="0" smtClean="0"/>
-              <a:t>differences</a:t>
+              <a:t>differences in sequences with high </a:t>
+            </a:r>
+            <a:r>
+              <a:rPr lang="en-US" dirty="0"/>
+              <a:t>similarity (&gt;97</a:t>
             </a:r>
             <a:r>
               <a:rPr lang="en-US" dirty="0" smtClean="0"/>
-              <a:t> </a:t>
-            </a:r>
+              <a:t>%)</a:t>
+            </a:r>
+          </a:p>
+          <a:p>
+            <a:pPr lvl="1"/>
             <a:r>
               <a:rPr lang="en-US" dirty="0" smtClean="0"/>
-              <a:t>in sequences with </a:t>
-            </a:r>
-            <a:r>
-              <a:rPr lang="en-US" dirty="0" smtClean="0"/>
-              <a:t>high </a:t>
-            </a:r>
-            <a:r>
-              <a:rPr lang="en-US" dirty="0"/>
-              <a:t>similarity (&gt;97%) </a:t>
-            </a:r>
+              <a:t>Typically have higher false positive rate than denoising approaches </a:t>
+            </a:r>
+            <a:endParaRPr lang="en-US" dirty="0"/>
           </a:p>
           <a:p>
             <a:pPr lvl="1"/>
@@ -16000,7 +16436,7 @@
 </p:sld>
 </file>
 
-<file path=ppt/slides/slide5.xml><?xml version="1.0" encoding="utf-8"?>
+<file path=ppt/slides/slide6.xml><?xml version="1.0" encoding="utf-8"?>
 <p:sld xmlns:a="http://schemas.openxmlformats.org/drawingml/2006/main" xmlns:r="http://schemas.openxmlformats.org/officeDocument/2006/relationships" xmlns:p="http://schemas.openxmlformats.org/presentationml/2006/main">
   <p:cSld>
     <p:spTree>
@@ -16124,7 +16560,7 @@
 </p:sld>
 </file>
 
-<file path=ppt/slides/slide6.xml><?xml version="1.0" encoding="utf-8"?>
+<file path=ppt/slides/slide7.xml><?xml version="1.0" encoding="utf-8"?>
 <p:sld xmlns:a="http://schemas.openxmlformats.org/drawingml/2006/main" xmlns:r="http://schemas.openxmlformats.org/officeDocument/2006/relationships" xmlns:p="http://schemas.openxmlformats.org/presentationml/2006/main">
   <p:cSld>
     <p:spTree>
@@ -16351,7 +16787,7 @@
 </p:sld>
 </file>
 
-<file path=ppt/slides/slide7.xml><?xml version="1.0" encoding="utf-8"?>
+<file path=ppt/slides/slide8.xml><?xml version="1.0" encoding="utf-8"?>
 <p:sld xmlns:a="http://schemas.openxmlformats.org/drawingml/2006/main" xmlns:r="http://schemas.openxmlformats.org/officeDocument/2006/relationships" xmlns:p="http://schemas.openxmlformats.org/presentationml/2006/main">
   <p:cSld>
     <p:spTree>
@@ -16457,8 +16893,8 @@
         </p:nvSpPr>
         <p:spPr>
           <a:xfrm>
-            <a:off x="667512" y="4656745"/>
-            <a:ext cx="11320272" cy="1846659"/>
+            <a:off x="529839" y="4656745"/>
+            <a:ext cx="11457945" cy="1846659"/>
           </a:xfrm>
           <a:prstGeom prst="rect">
             <a:avLst/>
@@ -16504,15 +16940,7 @@
             </a:r>
             <a:r>
               <a:rPr lang="en-US" dirty="0" smtClean="0"/>
-              <a:t>(</a:t>
-            </a:r>
-            <a:r>
-              <a:rPr lang="en-US" dirty="0" smtClean="0"/>
-              <a:t>may</a:t>
-            </a:r>
-            <a:r>
-              <a:rPr lang="en-US" dirty="0" smtClean="0"/>
-              <a:t> </a:t>
+              <a:t>(may </a:t>
             </a:r>
             <a:r>
               <a:rPr lang="en-US" dirty="0"/>
@@ -16526,7 +16954,15 @@
             </a:pPr>
             <a:r>
               <a:rPr lang="en-US" sz="2400" dirty="0"/>
-              <a:t>Most pipelines assume single or paired end file for each sample (~5 to 100k reads each)</a:t>
+              <a:t>Most pipelines assume single or paired end file for each sample (~</a:t>
+            </a:r>
+            <a:r>
+              <a:rPr lang="en-US" sz="2400" dirty="0" smtClean="0"/>
+              <a:t>5k </a:t>
+            </a:r>
+            <a:r>
+              <a:rPr lang="en-US" sz="2400" dirty="0"/>
+              <a:t>to 100k reads each)</a:t>
             </a:r>
           </a:p>
           <a:p>
@@ -16591,96 +17027,6 @@
     <p:extLst>
       <p:ext uri="{BB962C8B-B14F-4D97-AF65-F5344CB8AC3E}">
         <p14:creationId xmlns:p14="http://schemas.microsoft.com/office/powerpoint/2010/main" val="1594170731"/>
-      </p:ext>
-    </p:extLst>
-  </p:cSld>
-  <p:clrMapOvr>
-    <a:masterClrMapping/>
-  </p:clrMapOvr>
-  <p:timing>
-    <p:tnLst>
-      <p:par>
-        <p:cTn id="1" dur="indefinite" restart="never" nodeType="tmRoot"/>
-      </p:par>
-    </p:tnLst>
-  </p:timing>
-</p:sld>
-</file>
-
-<file path=ppt/slides/slide8.xml><?xml version="1.0" encoding="utf-8"?>
-<p:sld xmlns:a="http://schemas.openxmlformats.org/drawingml/2006/main" xmlns:r="http://schemas.openxmlformats.org/officeDocument/2006/relationships" xmlns:p="http://schemas.openxmlformats.org/presentationml/2006/main">
-  <p:cSld>
-    <p:spTree>
-      <p:nvGrpSpPr>
-        <p:cNvPr id="1" name=""/>
-        <p:cNvGrpSpPr/>
-        <p:nvPr/>
-      </p:nvGrpSpPr>
-      <p:grpSpPr>
-        <a:xfrm>
-          <a:off x="0" y="0"/>
-          <a:ext cx="0" cy="0"/>
-          <a:chOff x="0" y="0"/>
-          <a:chExt cx="0" cy="0"/>
-        </a:xfrm>
-      </p:grpSpPr>
-      <p:sp>
-        <p:nvSpPr>
-          <p:cNvPr id="2" name="Title 1"/>
-          <p:cNvSpPr>
-            <a:spLocks noGrp="1"/>
-          </p:cNvSpPr>
-          <p:nvPr>
-            <p:ph type="title"/>
-          </p:nvPr>
-        </p:nvSpPr>
-        <p:spPr>
-          <a:xfrm>
-            <a:off x="292608" y="365125"/>
-            <a:ext cx="11649456" cy="1325563"/>
-          </a:xfrm>
-        </p:spPr>
-        <p:txBody>
-          <a:bodyPr/>
-          <a:lstStyle/>
-          <a:p>
-            <a:pPr algn="ctr"/>
-            <a:r>
-              <a:rPr lang="en-US" dirty="0"/>
-              <a:t>Common Steps in Amplicon Denoising Pipelines</a:t>
-            </a:r>
-          </a:p>
-        </p:txBody>
-      </p:sp>
-      <p:graphicFrame>
-        <p:nvGraphicFramePr>
-          <p:cNvPr id="5" name="Content Placeholder 4"/>
-          <p:cNvGraphicFramePr>
-            <a:graphicFrameLocks noGrp="1"/>
-          </p:cNvGraphicFramePr>
-          <p:nvPr>
-            <p:ph idx="1"/>
-            <p:extLst>
-              <p:ext uri="{D42A27DB-BD31-4B8C-83A1-F6EECF244321}">
-                <p14:modId xmlns:p14="http://schemas.microsoft.com/office/powerpoint/2010/main" val="1065096929"/>
-              </p:ext>
-            </p:extLst>
-          </p:nvPr>
-        </p:nvGraphicFramePr>
-        <p:xfrm>
-          <a:off x="838200" y="1825624"/>
-          <a:ext cx="10515600" cy="4630039"/>
-        </p:xfrm>
-        <a:graphic>
-          <a:graphicData uri="http://schemas.openxmlformats.org/drawingml/2006/diagram">
-            <dgm:relIds xmlns:dgm="http://schemas.openxmlformats.org/drawingml/2006/diagram" xmlns:r="http://schemas.openxmlformats.org/officeDocument/2006/relationships" r:dm="rId3" r:lo="rId4" r:qs="rId5" r:cs="rId6"/>
-          </a:graphicData>
-        </a:graphic>
-      </p:graphicFrame>
-    </p:spTree>
-    <p:extLst>
-      <p:ext uri="{BB962C8B-B14F-4D97-AF65-F5344CB8AC3E}">
-        <p14:creationId xmlns:p14="http://schemas.microsoft.com/office/powerpoint/2010/main" val="1218211399"/>
       </p:ext>
     </p:extLst>
   </p:cSld>
@@ -16724,63 +17070,160 @@
             <p:ph type="title"/>
           </p:nvPr>
         </p:nvSpPr>
+        <p:spPr/>
+        <p:txBody>
+          <a:bodyPr/>
+          <a:lstStyle/>
+          <a:p>
+            <a:pPr algn="ctr"/>
+            <a:r>
+              <a:rPr lang="en-US" dirty="0"/>
+              <a:t>Filtering Low Quality Reads</a:t>
+            </a:r>
+          </a:p>
+        </p:txBody>
+      </p:sp>
+      <p:sp>
+        <p:nvSpPr>
+          <p:cNvPr id="3" name="Content Placeholder 2"/>
+          <p:cNvSpPr>
+            <a:spLocks noGrp="1"/>
+          </p:cNvSpPr>
+          <p:nvPr>
+            <p:ph idx="1"/>
+          </p:nvPr>
+        </p:nvSpPr>
         <p:spPr>
           <a:xfrm>
-            <a:off x="687977" y="365125"/>
-            <a:ext cx="10763793" cy="1325563"/>
+            <a:off x="838200" y="1825624"/>
+            <a:ext cx="10515600" cy="4785487"/>
           </a:xfrm>
         </p:spPr>
         <p:txBody>
-          <a:bodyPr/>
+          <a:bodyPr>
+            <a:normAutofit fontScale="85000" lnSpcReduction="20000"/>
+          </a:bodyPr>
           <a:lstStyle/>
           <a:p>
-            <a:pPr algn="ctr"/>
             <a:r>
               <a:rPr lang="en-US" dirty="0"/>
-              <a:t>Managing Data Structures with Phyloseq</a:t>
-            </a:r>
+              <a:t>Low quality sequences containing a higher number of probable errors are typically removed</a:t>
+            </a:r>
+          </a:p>
+          <a:p>
+            <a:pPr lvl="1"/>
+            <a:r>
+              <a:rPr lang="en-US" dirty="0"/>
+              <a:t>If not, can (will) inflate false positive rate</a:t>
+            </a:r>
+          </a:p>
+          <a:p>
+            <a:endParaRPr lang="en-US" dirty="0"/>
+          </a:p>
+          <a:p>
+            <a:r>
+              <a:rPr lang="en-US" dirty="0"/>
+              <a:t>Illumina provides a quality score providing the </a:t>
+            </a:r>
+          </a:p>
+          <a:p>
+            <a:pPr marL="0" indent="0">
+              <a:buNone/>
+            </a:pPr>
+            <a:r>
+              <a:rPr lang="en-US" dirty="0"/>
+              <a:t>   probability of an error for each base call</a:t>
+            </a:r>
+          </a:p>
+          <a:p>
+            <a:endParaRPr lang="en-US" dirty="0"/>
+          </a:p>
+          <a:p>
+            <a:r>
+              <a:rPr lang="en-US" dirty="0"/>
+              <a:t>Expected number of errors is: </a:t>
+            </a:r>
+          </a:p>
+          <a:p>
+            <a:pPr lvl="1"/>
+            <a:r>
+              <a:rPr lang="en-US" dirty="0"/>
+              <a:t>E* = floor(sum(prob. error for each base))</a:t>
+            </a:r>
+          </a:p>
+          <a:p>
+            <a:pPr lvl="1"/>
+            <a:r>
+              <a:rPr lang="en-US" dirty="0"/>
+              <a:t>Proper calc. since error prob. is cumulative</a:t>
+            </a:r>
+          </a:p>
+          <a:p>
+            <a:pPr lvl="1"/>
+            <a:r>
+              <a:rPr lang="en-US" dirty="0">
+                <a:hlinkClick r:id="rId2"/>
+              </a:rPr>
+              <a:t>https://drive5.com/usearch/manual/exp_errs.html</a:t>
+            </a:r>
+            <a:endParaRPr lang="en-US" dirty="0"/>
+          </a:p>
+          <a:p>
+            <a:pPr lvl="1"/>
+            <a:endParaRPr lang="en-US" dirty="0"/>
+          </a:p>
+          <a:p>
+            <a:r>
+              <a:rPr lang="en-US" dirty="0"/>
+              <a:t>Typically filter reads with &gt;1 or 2 expected errors or any ambiguous bases</a:t>
+            </a:r>
+          </a:p>
+          <a:p>
+            <a:pPr lvl="1"/>
+            <a:r>
+              <a:rPr lang="en-US" dirty="0"/>
+              <a:t>Trim reads where the quality profile crashes to help retain more reads </a:t>
+            </a:r>
+          </a:p>
+          <a:p>
+            <a:endParaRPr lang="en-US" dirty="0"/>
           </a:p>
         </p:txBody>
       </p:sp>
       <p:pic>
         <p:nvPicPr>
-          <p:cNvPr id="4" name="Content Placeholder 3"/>
+          <p:cNvPr id="5" name="Picture 4"/>
           <p:cNvPicPr>
-            <a:picLocks noGrp="1" noChangeAspect="1"/>
+            <a:picLocks noChangeAspect="1"/>
           </p:cNvPicPr>
-          <p:nvPr>
-            <p:ph idx="1"/>
-          </p:nvPr>
+          <p:nvPr/>
         </p:nvPicPr>
         <p:blipFill>
-          <a:blip r:embed="rId2" cstate="print">
-            <a:extLst>
-              <a:ext uri="{28A0092B-C50C-407E-A947-70E740481C1C}">
-                <a14:useLocalDpi xmlns:a14="http://schemas.microsoft.com/office/drawing/2010/main" val="0"/>
-              </a:ext>
-            </a:extLst>
-          </a:blip>
+          <a:blip r:embed="rId3"/>
           <a:stretch>
             <a:fillRect/>
           </a:stretch>
         </p:blipFill>
         <p:spPr>
           <a:xfrm>
-            <a:off x="1588111" y="1690688"/>
-            <a:ext cx="8693856" cy="4300809"/>
+            <a:off x="7086600" y="2873686"/>
+            <a:ext cx="4904232" cy="2400878"/>
           </a:xfrm>
+          <a:prstGeom prst="rect">
+            <a:avLst/>
+          </a:prstGeom>
         </p:spPr>
       </p:pic>
       <p:sp>
         <p:nvSpPr>
-          <p:cNvPr id="5" name="TextBox 4"/>
+          <p:cNvPr id="6" name="TextBox 5"/>
           <p:cNvSpPr txBox="1"/>
           <p:nvPr/>
         </p:nvSpPr>
         <p:spPr>
           <a:xfrm>
-            <a:off x="9366216" y="6392091"/>
-            <a:ext cx="2825784" cy="369332"/>
+            <a:off x="3346704" y="6457562"/>
+            <a:ext cx="9144000" cy="338554"/>
           </a:xfrm>
           <a:prstGeom prst="rect">
             <a:avLst/>
@@ -16794,54 +17237,19 @@
           <a:lstStyle/>
           <a:p>
             <a:r>
-              <a:rPr lang="en-US" dirty="0"/>
-              <a:t>McMurdie, </a:t>
-            </a:r>
-            <a:r>
-              <a:rPr lang="en-US" i="1" dirty="0"/>
-              <a:t>PLOS ONE</a:t>
-            </a:r>
-            <a:r>
-              <a:rPr lang="en-US" dirty="0"/>
-              <a:t>, 2013</a:t>
-            </a:r>
+              <a:rPr lang="en-US" sz="1600" dirty="0">
+                <a:hlinkClick r:id="rId4"/>
+              </a:rPr>
+              <a:t>https://www.illumina.com/documents/products/technotes/technote_understanding_quality_scores.pdf</a:t>
+            </a:r>
+            <a:endParaRPr lang="en-US" sz="1600" dirty="0"/>
           </a:p>
         </p:txBody>
       </p:sp>
-      <p:pic>
-        <p:nvPicPr>
-          <p:cNvPr id="6" name="Content Placeholder 3"/>
-          <p:cNvPicPr>
-            <a:picLocks noChangeAspect="1"/>
-          </p:cNvPicPr>
-          <p:nvPr/>
-        </p:nvPicPr>
-        <p:blipFill>
-          <a:blip r:embed="rId3" cstate="print">
-            <a:extLst>
-              <a:ext uri="{28A0092B-C50C-407E-A947-70E740481C1C}">
-                <a14:useLocalDpi xmlns:a14="http://schemas.microsoft.com/office/drawing/2010/main" val="0"/>
-              </a:ext>
-            </a:extLst>
-          </a:blip>
-          <a:stretch>
-            <a:fillRect/>
-          </a:stretch>
-        </p:blipFill>
-        <p:spPr>
-          <a:xfrm>
-            <a:off x="10682430" y="365125"/>
-            <a:ext cx="1217134" cy="943111"/>
-          </a:xfrm>
-          <a:prstGeom prst="rect">
-            <a:avLst/>
-          </a:prstGeom>
-        </p:spPr>
-      </p:pic>
     </p:spTree>
     <p:extLst>
       <p:ext uri="{BB962C8B-B14F-4D97-AF65-F5344CB8AC3E}">
-        <p14:creationId xmlns:p14="http://schemas.microsoft.com/office/powerpoint/2010/main" val="3069183188"/>
+        <p14:creationId xmlns:p14="http://schemas.microsoft.com/office/powerpoint/2010/main" val="238426400"/>
       </p:ext>
     </p:extLst>
   </p:cSld>

</xml_diff>